<commit_message>
vault backup: 2025-02-13 12:00:04
</commit_message>
<xml_diff>
--- a/GK Geschichte/HandodHobbes.pptx
+++ b/GK Geschichte/HandodHobbes.pptx
@@ -104,6 +104,11 @@
       </a:defRPr>
     </a:lvl9pPr>
   </p:defaultTextStyle>
+  <p:extLst>
+    <p:ext uri="{EFAFB233-063F-42B5-8137-9DF3F51BA10A}">
+      <p15:sldGuideLst xmlns:p15="http://schemas.microsoft.com/office/powerpoint/2012/main"/>
+    </p:ext>
+  </p:extLst>
 </p:presentation>
 </file>
 
@@ -238,7 +243,7 @@
           <a:p>
             <a:fld id="{ED1FB657-D43F-420C-866C-130C75C75E62}" type="datetimeFigureOut">
               <a:rPr lang="de-DE" smtClean="0"/>
-              <a:t>24.01.2025</a:t>
+              <a:t>29.01.2025</a:t>
             </a:fld>
             <a:endParaRPr lang="de-DE"/>
           </a:p>
@@ -408,7 +413,7 @@
           <a:p>
             <a:fld id="{ED1FB657-D43F-420C-866C-130C75C75E62}" type="datetimeFigureOut">
               <a:rPr lang="de-DE" smtClean="0"/>
-              <a:t>24.01.2025</a:t>
+              <a:t>29.01.2025</a:t>
             </a:fld>
             <a:endParaRPr lang="de-DE"/>
           </a:p>
@@ -588,7 +593,7 @@
           <a:p>
             <a:fld id="{ED1FB657-D43F-420C-866C-130C75C75E62}" type="datetimeFigureOut">
               <a:rPr lang="de-DE" smtClean="0"/>
-              <a:t>24.01.2025</a:t>
+              <a:t>29.01.2025</a:t>
             </a:fld>
             <a:endParaRPr lang="de-DE"/>
           </a:p>
@@ -758,7 +763,7 @@
           <a:p>
             <a:fld id="{ED1FB657-D43F-420C-866C-130C75C75E62}" type="datetimeFigureOut">
               <a:rPr lang="de-DE" smtClean="0"/>
-              <a:t>24.01.2025</a:t>
+              <a:t>29.01.2025</a:t>
             </a:fld>
             <a:endParaRPr lang="de-DE"/>
           </a:p>
@@ -1004,7 +1009,7 @@
           <a:p>
             <a:fld id="{ED1FB657-D43F-420C-866C-130C75C75E62}" type="datetimeFigureOut">
               <a:rPr lang="de-DE" smtClean="0"/>
-              <a:t>24.01.2025</a:t>
+              <a:t>29.01.2025</a:t>
             </a:fld>
             <a:endParaRPr lang="de-DE"/>
           </a:p>
@@ -1236,7 +1241,7 @@
           <a:p>
             <a:fld id="{ED1FB657-D43F-420C-866C-130C75C75E62}" type="datetimeFigureOut">
               <a:rPr lang="de-DE" smtClean="0"/>
-              <a:t>24.01.2025</a:t>
+              <a:t>29.01.2025</a:t>
             </a:fld>
             <a:endParaRPr lang="de-DE"/>
           </a:p>
@@ -1603,7 +1608,7 @@
           <a:p>
             <a:fld id="{ED1FB657-D43F-420C-866C-130C75C75E62}" type="datetimeFigureOut">
               <a:rPr lang="de-DE" smtClean="0"/>
-              <a:t>24.01.2025</a:t>
+              <a:t>29.01.2025</a:t>
             </a:fld>
             <a:endParaRPr lang="de-DE"/>
           </a:p>
@@ -1721,7 +1726,7 @@
           <a:p>
             <a:fld id="{ED1FB657-D43F-420C-866C-130C75C75E62}" type="datetimeFigureOut">
               <a:rPr lang="de-DE" smtClean="0"/>
-              <a:t>24.01.2025</a:t>
+              <a:t>29.01.2025</a:t>
             </a:fld>
             <a:endParaRPr lang="de-DE"/>
           </a:p>
@@ -1816,7 +1821,7 @@
           <a:p>
             <a:fld id="{ED1FB657-D43F-420C-866C-130C75C75E62}" type="datetimeFigureOut">
               <a:rPr lang="de-DE" smtClean="0"/>
-              <a:t>24.01.2025</a:t>
+              <a:t>29.01.2025</a:t>
             </a:fld>
             <a:endParaRPr lang="de-DE"/>
           </a:p>
@@ -2093,7 +2098,7 @@
           <a:p>
             <a:fld id="{ED1FB657-D43F-420C-866C-130C75C75E62}" type="datetimeFigureOut">
               <a:rPr lang="de-DE" smtClean="0"/>
-              <a:t>24.01.2025</a:t>
+              <a:t>29.01.2025</a:t>
             </a:fld>
             <a:endParaRPr lang="de-DE"/>
           </a:p>
@@ -2350,7 +2355,7 @@
           <a:p>
             <a:fld id="{ED1FB657-D43F-420C-866C-130C75C75E62}" type="datetimeFigureOut">
               <a:rPr lang="de-DE" smtClean="0"/>
-              <a:t>24.01.2025</a:t>
+              <a:t>29.01.2025</a:t>
             </a:fld>
             <a:endParaRPr lang="de-DE"/>
           </a:p>
@@ -2563,7 +2568,7 @@
           <a:p>
             <a:fld id="{ED1FB657-D43F-420C-866C-130C75C75E62}" type="datetimeFigureOut">
               <a:rPr lang="de-DE" smtClean="0"/>
-              <a:t>24.01.2025</a:t>
+              <a:t>29.01.2025</a:t>
             </a:fld>
             <a:endParaRPr lang="de-DE"/>
           </a:p>
@@ -2991,7 +2996,7 @@
         <p:spPr>
           <a:xfrm>
             <a:off x="763213" y="323610"/>
-            <a:ext cx="6033247" cy="646331"/>
+            <a:ext cx="6033247" cy="707886"/>
           </a:xfrm>
           <a:prstGeom prst="rect">
             <a:avLst/>
@@ -3006,7 +3011,7 @@
           <a:p>
             <a:pPr algn="ctr"/>
             <a:r>
-              <a:rPr lang="de-DE" sz="3600" noProof="0" dirty="0">
+              <a:rPr lang="de-DE" sz="4000" noProof="0" dirty="0">
                 <a:solidFill>
                   <a:srgbClr val="FFFFFF"/>
                 </a:solidFill>
@@ -3100,7 +3105,7 @@
         </p:blipFill>
         <p:spPr>
           <a:xfrm>
-            <a:off x="5776525" y="1562515"/>
+            <a:off x="5776525" y="1524344"/>
             <a:ext cx="1517761" cy="1487406"/>
           </a:xfrm>
           <a:prstGeom prst="rect">
@@ -3517,7 +3522,7 @@
         </p:nvSpPr>
         <p:spPr>
           <a:xfrm>
-            <a:off x="763213" y="845254"/>
+            <a:off x="763213" y="858089"/>
             <a:ext cx="6033247" cy="307777"/>
           </a:xfrm>
           <a:prstGeom prst="rect">
@@ -3537,7 +3542,7 @@
                 <a:solidFill>
                   <a:srgbClr val="FFFFFF"/>
                 </a:solidFill>
-                <a:latin typeface="Bahnschrift" panose="020B0502040204020203" pitchFamily="34" charset="0"/>
+                <a:latin typeface="JetBrains Mono" panose="02000009000000000000" pitchFamily="49" charset="0"/>
                 <a:ea typeface="JetBrains Mono" panose="02000009000000000000" pitchFamily="49" charset="0"/>
                 <a:cs typeface="JetBrains Mono" panose="02000009000000000000" pitchFamily="49" charset="0"/>
               </a:rPr>
@@ -3929,8 +3934,8 @@
         </p:nvSpPr>
         <p:spPr>
           <a:xfrm>
-            <a:off x="6672671" y="3184291"/>
-            <a:ext cx="621615" cy="276999"/>
+            <a:off x="5506709" y="3285010"/>
+            <a:ext cx="1246872" cy="369332"/>
           </a:xfrm>
           <a:prstGeom prst="rect">
             <a:avLst/>
@@ -3945,11 +3950,13 @@
           <a:p>
             <a:pPr algn="ctr"/>
             <a:r>
-              <a:rPr lang="de-DE" sz="1200" i="1" noProof="0" dirty="0">
+              <a:rPr lang="de-DE" noProof="0" dirty="0">
                 <a:solidFill>
                   <a:srgbClr val="FFFFFF"/>
                 </a:solidFill>
-                <a:latin typeface="Bahnschrift" panose="020B0502040204020203" pitchFamily="34" charset="0"/>
+                <a:latin typeface="JetBrains Mono" panose="02000009000000000000" pitchFamily="49" charset="0"/>
+                <a:ea typeface="JetBrains Mono" panose="02000009000000000000" pitchFamily="49" charset="0"/>
+                <a:cs typeface="JetBrains Mono" panose="02000009000000000000" pitchFamily="49" charset="0"/>
               </a:rPr>
               <a:t>Leben</a:t>
             </a:r>
@@ -3994,6 +4001,9 @@
                 <a:solidFill>
                   <a:srgbClr val="FFFFFF"/>
                 </a:solidFill>
+                <a:latin typeface="JetBrains Mono" panose="02000009000000000000" pitchFamily="49" charset="0"/>
+                <a:ea typeface="JetBrains Mono" panose="02000009000000000000" pitchFamily="49" charset="0"/>
+                <a:cs typeface="JetBrains Mono" panose="02000009000000000000" pitchFamily="49" charset="0"/>
               </a:rPr>
               <a:t>Philosophische Grundlagen</a:t>
             </a:r>
@@ -4014,7 +4024,7 @@
         </p:nvSpPr>
         <p:spPr>
           <a:xfrm>
-            <a:off x="376188" y="5201975"/>
+            <a:off x="369435" y="5345620"/>
             <a:ext cx="4383447" cy="369332"/>
           </a:xfrm>
           <a:prstGeom prst="rect">
@@ -4038,6 +4048,9 @@
                 <a:solidFill>
                   <a:srgbClr val="FFFFFF"/>
                 </a:solidFill>
+                <a:latin typeface="JetBrains Mono" panose="02000009000000000000" pitchFamily="49" charset="0"/>
+                <a:ea typeface="JetBrains Mono" panose="02000009000000000000" pitchFamily="49" charset="0"/>
+                <a:cs typeface="JetBrains Mono" panose="02000009000000000000" pitchFamily="49" charset="0"/>
               </a:rPr>
               <a:t>Werke</a:t>
             </a:r>
@@ -4058,7 +4071,7 @@
         </p:nvSpPr>
         <p:spPr>
           <a:xfrm>
-            <a:off x="376187" y="7385246"/>
+            <a:off x="369435" y="7103900"/>
             <a:ext cx="4383447" cy="369332"/>
           </a:xfrm>
           <a:prstGeom prst="rect">
@@ -4082,6 +4095,9 @@
                 <a:solidFill>
                   <a:srgbClr val="FFFFFF"/>
                 </a:solidFill>
+                <a:latin typeface="JetBrains Mono" panose="02000009000000000000" pitchFamily="49" charset="0"/>
+                <a:ea typeface="JetBrains Mono" panose="02000009000000000000" pitchFamily="49" charset="0"/>
+                <a:cs typeface="JetBrains Mono" panose="02000009000000000000" pitchFamily="49" charset="0"/>
               </a:rPr>
               <a:t>Auswirkungen </a:t>
             </a:r>
@@ -4102,7 +4118,7 @@
         </p:nvSpPr>
         <p:spPr>
           <a:xfrm>
-            <a:off x="376187" y="5576901"/>
+            <a:off x="369434" y="5720546"/>
             <a:ext cx="4383447" cy="954107"/>
           </a:xfrm>
           <a:prstGeom prst="rect">
@@ -4130,6 +4146,7 @@
                 <a:solidFill>
                   <a:srgbClr val="FFFFFF"/>
                 </a:solidFill>
+                <a:latin typeface="Bahnschrift" panose="020B0502040204020203" pitchFamily="34" charset="0"/>
               </a:rPr>
               <a:t>Leviathan (1651)</a:t>
             </a:r>
@@ -4144,6 +4161,7 @@
                 <a:solidFill>
                   <a:srgbClr val="FFFFFF"/>
                 </a:solidFill>
+                <a:latin typeface="Bahnschrift" panose="020B0502040204020203" pitchFamily="34" charset="0"/>
               </a:rPr>
               <a:t>De </a:t>
             </a:r>
@@ -4152,6 +4170,7 @@
                 <a:solidFill>
                   <a:srgbClr val="FFFFFF"/>
                 </a:solidFill>
+                <a:latin typeface="Bahnschrift" panose="020B0502040204020203" pitchFamily="34" charset="0"/>
               </a:rPr>
               <a:t>Cive</a:t>
             </a:r>
@@ -4160,6 +4179,7 @@
                 <a:solidFill>
                   <a:srgbClr val="FFFFFF"/>
                 </a:solidFill>
+                <a:latin typeface="Bahnschrift" panose="020B0502040204020203" pitchFamily="34" charset="0"/>
               </a:rPr>
               <a:t> (1647)</a:t>
             </a:r>
@@ -4174,6 +4194,7 @@
                 <a:solidFill>
                   <a:srgbClr val="FFFFFF"/>
                 </a:solidFill>
+                <a:latin typeface="Bahnschrift" panose="020B0502040204020203" pitchFamily="34" charset="0"/>
               </a:rPr>
               <a:t>De Corpore (1655)</a:t>
             </a:r>
@@ -4188,6 +4209,7 @@
                 <a:solidFill>
                   <a:srgbClr val="FFFFFF"/>
                 </a:solidFill>
+                <a:latin typeface="Bahnschrift" panose="020B0502040204020203" pitchFamily="34" charset="0"/>
               </a:rPr>
               <a:t>Behemoth (1681)</a:t>
             </a:r>
@@ -4208,8 +4230,8 @@
         </p:nvSpPr>
         <p:spPr>
           <a:xfrm>
-            <a:off x="376187" y="1868167"/>
-            <a:ext cx="4383447" cy="2893100"/>
+            <a:off x="376187" y="1862724"/>
+            <a:ext cx="4383447" cy="3108543"/>
           </a:xfrm>
           <a:prstGeom prst="rect">
             <a:avLst/>
@@ -4237,6 +4259,7 @@
                 <a:solidFill>
                   <a:srgbClr val="FFFFFF"/>
                 </a:solidFill>
+                <a:latin typeface="Bahnschrift" panose="020B0502040204020203" pitchFamily="34" charset="0"/>
               </a:rPr>
               <a:t>Menschenbild</a:t>
             </a:r>
@@ -4251,6 +4274,7 @@
                 <a:solidFill>
                   <a:srgbClr val="FFFFFF"/>
                 </a:solidFill>
+                <a:latin typeface="Bahnschrift" panose="020B0502040204020203" pitchFamily="34" charset="0"/>
               </a:rPr>
               <a:t>Negatives Menschenbild</a:t>
             </a:r>
@@ -4265,6 +4289,7 @@
                 <a:solidFill>
                   <a:srgbClr val="FFFFFF"/>
                 </a:solidFill>
+                <a:latin typeface="Bahnschrift" panose="020B0502040204020203" pitchFamily="34" charset="0"/>
               </a:rPr>
               <a:t>Ohne staatliche </a:t>
             </a:r>
@@ -4273,6 +4298,7 @@
                 <a:solidFill>
                   <a:srgbClr val="FFFFFF"/>
                 </a:solidFill>
+                <a:latin typeface="Bahnschrift" panose="020B0502040204020203" pitchFamily="34" charset="0"/>
               </a:rPr>
               <a:t>Ordnung sind Menschen im Naturzustand</a:t>
             </a:r>
@@ -4287,6 +4313,7 @@
                 <a:solidFill>
                   <a:srgbClr val="FFFFFF"/>
                 </a:solidFill>
+                <a:latin typeface="Bahnschrift" panose="020B0502040204020203" pitchFamily="34" charset="0"/>
               </a:rPr>
               <a:t>„Krieg alle gegen alle“</a:t>
             </a:r>
@@ -4302,6 +4329,7 @@
                 <a:solidFill>
                   <a:srgbClr val="FFFFFF"/>
                 </a:solidFill>
+                <a:latin typeface="Bahnschrift" panose="020B0502040204020203" pitchFamily="34" charset="0"/>
               </a:rPr>
               <a:t>Vertragstheorie</a:t>
             </a:r>
@@ -4316,6 +4344,7 @@
                 <a:solidFill>
                   <a:srgbClr val="FFFFFF"/>
                 </a:solidFill>
+                <a:latin typeface="Bahnschrift" panose="020B0502040204020203" pitchFamily="34" charset="0"/>
               </a:rPr>
               <a:t>Ziel: der Politik eine Wissenschaftliche Basis zu geben</a:t>
             </a:r>
@@ -4330,6 +4359,7 @@
                 <a:solidFill>
                   <a:srgbClr val="FFFFFF"/>
                 </a:solidFill>
+                <a:latin typeface="Bahnschrift" panose="020B0502040204020203" pitchFamily="34" charset="0"/>
               </a:rPr>
               <a:t>Jeder tritt sein Naturrecht dem Souverän ab</a:t>
             </a:r>
@@ -4344,12 +4374,411 @@
                 <a:solidFill>
                   <a:srgbClr val="FFFFFF"/>
                 </a:solidFill>
+                <a:latin typeface="Bahnschrift" panose="020B0502040204020203" pitchFamily="34" charset="0"/>
               </a:rPr>
               <a:t>Nur der Souverän ist in der Lage den Naturzustand zu verhindern</a:t>
             </a:r>
           </a:p>
-        </p:txBody>
-      </p:sp>
+          <a:p>
+            <a:pPr lvl="1"/>
+            <a:endParaRPr lang="de-DE" sz="1400" dirty="0">
+              <a:solidFill>
+                <a:srgbClr val="FFFFFF"/>
+              </a:solidFill>
+              <a:latin typeface="Bahnschrift" panose="020B0502040204020203" pitchFamily="34" charset="0"/>
+            </a:endParaRPr>
+          </a:p>
+        </p:txBody>
+      </p:sp>
+      <p:sp>
+        <p:nvSpPr>
+          <p:cNvPr id="2" name="TextBox 1">
+            <a:extLst>
+              <a:ext uri="{FF2B5EF4-FFF2-40B4-BE49-F238E27FC236}">
+                <a16:creationId xmlns:a16="http://schemas.microsoft.com/office/drawing/2014/main" id="{EAB4DC1F-1F02-4E0C-8C54-29763E032898}"/>
+              </a:ext>
+            </a:extLst>
+          </p:cNvPr>
+          <p:cNvSpPr txBox="1"/>
+          <p:nvPr/>
+        </p:nvSpPr>
+        <p:spPr>
+          <a:xfrm>
+            <a:off x="370472" y="7473232"/>
+            <a:ext cx="4383453" cy="2323457"/>
+          </a:xfrm>
+          <a:prstGeom prst="rect">
+            <a:avLst/>
+          </a:prstGeom>
+          <a:noFill/>
+          <a:ln w="38100">
+            <a:solidFill>
+              <a:schemeClr val="bg1"/>
+            </a:solidFill>
+          </a:ln>
+        </p:spPr>
+        <p:txBody>
+          <a:bodyPr wrap="square" rtlCol="0" anchor="t">
+            <a:spAutoFit/>
+          </a:bodyPr>
+          <a:lstStyle/>
+          <a:p>
+            <a:pPr marL="285750" indent="-285750">
+              <a:lnSpc>
+                <a:spcPct val="150000"/>
+              </a:lnSpc>
+              <a:buFont typeface="Arial" panose="020B0604020202020204" pitchFamily="34" charset="0"/>
+              <a:buChar char="•"/>
+            </a:pPr>
+            <a:r>
+              <a:rPr lang="de-DE" sz="1400" noProof="0" dirty="0">
+                <a:solidFill>
+                  <a:srgbClr val="FFFFFF"/>
+                </a:solidFill>
+                <a:latin typeface="Bahnschrift" panose="020B0502040204020203" pitchFamily="34" charset="0"/>
+              </a:rPr>
+              <a:t>Wichtiger Begründer des Gesellschaftsvertrags</a:t>
+            </a:r>
+          </a:p>
+          <a:p>
+            <a:pPr marL="742950" lvl="1" indent="-285750">
+              <a:lnSpc>
+                <a:spcPct val="150000"/>
+              </a:lnSpc>
+              <a:buFont typeface="Arial" panose="020B0604020202020204" pitchFamily="34" charset="0"/>
+              <a:buChar char="•"/>
+            </a:pPr>
+            <a:r>
+              <a:rPr lang="de-DE" sz="1400" dirty="0">
+                <a:solidFill>
+                  <a:srgbClr val="FFFFFF"/>
+                </a:solidFill>
+                <a:latin typeface="Bahnschrift" panose="020B0502040204020203" pitchFamily="34" charset="0"/>
+              </a:rPr>
+              <a:t>Bildet die Grundlage für viele Gesellschaftssysteme, </a:t>
+            </a:r>
+            <a:r>
+              <a:rPr lang="de-DE" sz="1400" dirty="0" err="1">
+                <a:solidFill>
+                  <a:srgbClr val="FFFFFF"/>
+                </a:solidFill>
+                <a:latin typeface="Bahnschrift" panose="020B0502040204020203" pitchFamily="34" charset="0"/>
+              </a:rPr>
+              <a:t>u.A.</a:t>
+            </a:r>
+            <a:r>
+              <a:rPr lang="de-DE" sz="1400" dirty="0">
+                <a:solidFill>
+                  <a:srgbClr val="FFFFFF"/>
+                </a:solidFill>
+                <a:latin typeface="Bahnschrift" panose="020B0502040204020203" pitchFamily="34" charset="0"/>
+              </a:rPr>
+              <a:t>  Absolutismus</a:t>
+            </a:r>
+          </a:p>
+          <a:p>
+            <a:pPr marL="285750" indent="-285750">
+              <a:lnSpc>
+                <a:spcPct val="150000"/>
+              </a:lnSpc>
+              <a:buFont typeface="Arial" panose="020B0604020202020204" pitchFamily="34" charset="0"/>
+              <a:buChar char="•"/>
+            </a:pPr>
+            <a:r>
+              <a:rPr lang="de-DE" sz="1400" dirty="0">
+                <a:solidFill>
+                  <a:srgbClr val="FFFFFF"/>
+                </a:solidFill>
+                <a:latin typeface="Bahnschrift" panose="020B0502040204020203" pitchFamily="34" charset="0"/>
+              </a:rPr>
+              <a:t>Betonung der Sicherheitsfunktion des Staates</a:t>
+            </a:r>
+          </a:p>
+          <a:p>
+            <a:pPr marL="742950" lvl="1" indent="-285750">
+              <a:lnSpc>
+                <a:spcPct val="150000"/>
+              </a:lnSpc>
+              <a:buFont typeface="Wingdings" panose="05000000000000000000" pitchFamily="2" charset="2"/>
+              <a:buChar char="Ø"/>
+            </a:pPr>
+            <a:r>
+              <a:rPr lang="de-DE" sz="1400" dirty="0">
+                <a:solidFill>
+                  <a:srgbClr val="FFFFFF"/>
+                </a:solidFill>
+                <a:latin typeface="Bahnschrift" panose="020B0502040204020203" pitchFamily="34" charset="0"/>
+              </a:rPr>
+              <a:t>Moderne Regierung mit starker Zentralgewalt und Exekutive</a:t>
+            </a:r>
+          </a:p>
+          <a:p>
+            <a:pPr marL="742950" lvl="1" indent="-285750">
+              <a:lnSpc>
+                <a:spcPct val="150000"/>
+              </a:lnSpc>
+              <a:buFont typeface="Arial" panose="020B0604020202020204" pitchFamily="34" charset="0"/>
+              <a:buChar char="•"/>
+            </a:pPr>
+            <a:endParaRPr lang="de-DE" sz="1400" noProof="0" dirty="0">
+              <a:solidFill>
+                <a:srgbClr val="FFFFFF"/>
+              </a:solidFill>
+              <a:latin typeface="Bahnschrift" panose="020B0502040204020203" pitchFamily="34" charset="0"/>
+            </a:endParaRPr>
+          </a:p>
+        </p:txBody>
+      </p:sp>
+      <p:cxnSp>
+        <p:nvCxnSpPr>
+          <p:cNvPr id="5" name="Straight Connector 4">
+            <a:extLst>
+              <a:ext uri="{FF2B5EF4-FFF2-40B4-BE49-F238E27FC236}">
+                <a16:creationId xmlns:a16="http://schemas.microsoft.com/office/drawing/2014/main" id="{27EACEA7-1BC7-279C-43A9-EC50C87B4BB5}"/>
+              </a:ext>
+            </a:extLst>
+          </p:cNvPr>
+          <p:cNvCxnSpPr/>
+          <p:nvPr/>
+        </p:nvCxnSpPr>
+        <p:spPr>
+          <a:xfrm>
+            <a:off x="3215640" y="2179320"/>
+            <a:ext cx="1409700" cy="0"/>
+          </a:xfrm>
+          <a:prstGeom prst="line">
+            <a:avLst/>
+          </a:prstGeom>
+          <a:ln>
+            <a:solidFill>
+              <a:schemeClr val="bg1"/>
+            </a:solidFill>
+          </a:ln>
+        </p:spPr>
+        <p:style>
+          <a:lnRef idx="2">
+            <a:schemeClr val="accent1"/>
+          </a:lnRef>
+          <a:fillRef idx="0">
+            <a:schemeClr val="accent1"/>
+          </a:fillRef>
+          <a:effectRef idx="1">
+            <a:schemeClr val="accent1"/>
+          </a:effectRef>
+          <a:fontRef idx="minor">
+            <a:schemeClr val="tx1"/>
+          </a:fontRef>
+        </p:style>
+      </p:cxnSp>
+      <p:cxnSp>
+        <p:nvCxnSpPr>
+          <p:cNvPr id="6" name="Straight Connector 5">
+            <a:extLst>
+              <a:ext uri="{FF2B5EF4-FFF2-40B4-BE49-F238E27FC236}">
+                <a16:creationId xmlns:a16="http://schemas.microsoft.com/office/drawing/2014/main" id="{A9BF998C-EF98-B590-C0B5-E8C5BC95D3D4}"/>
+              </a:ext>
+            </a:extLst>
+          </p:cNvPr>
+          <p:cNvCxnSpPr/>
+          <p:nvPr/>
+        </p:nvCxnSpPr>
+        <p:spPr>
+          <a:xfrm>
+            <a:off x="518160" y="2179320"/>
+            <a:ext cx="1409700" cy="0"/>
+          </a:xfrm>
+          <a:prstGeom prst="line">
+            <a:avLst/>
+          </a:prstGeom>
+          <a:ln>
+            <a:solidFill>
+              <a:schemeClr val="bg1"/>
+            </a:solidFill>
+          </a:ln>
+        </p:spPr>
+        <p:style>
+          <a:lnRef idx="2">
+            <a:schemeClr val="accent1"/>
+          </a:lnRef>
+          <a:fillRef idx="0">
+            <a:schemeClr val="accent1"/>
+          </a:fillRef>
+          <a:effectRef idx="1">
+            <a:schemeClr val="accent1"/>
+          </a:effectRef>
+          <a:fontRef idx="minor">
+            <a:schemeClr val="tx1"/>
+          </a:fontRef>
+        </p:style>
+      </p:cxnSp>
+      <p:cxnSp>
+        <p:nvCxnSpPr>
+          <p:cNvPr id="8" name="Straight Connector 7">
+            <a:extLst>
+              <a:ext uri="{FF2B5EF4-FFF2-40B4-BE49-F238E27FC236}">
+                <a16:creationId xmlns:a16="http://schemas.microsoft.com/office/drawing/2014/main" id="{2210CB43-2E7F-BDE5-397E-165DFF1C6F28}"/>
+              </a:ext>
+            </a:extLst>
+          </p:cNvPr>
+          <p:cNvCxnSpPr/>
+          <p:nvPr/>
+        </p:nvCxnSpPr>
+        <p:spPr>
+          <a:xfrm>
+            <a:off x="3215640" y="3461290"/>
+            <a:ext cx="1409700" cy="0"/>
+          </a:xfrm>
+          <a:prstGeom prst="line">
+            <a:avLst/>
+          </a:prstGeom>
+          <a:ln>
+            <a:solidFill>
+              <a:schemeClr val="bg1"/>
+            </a:solidFill>
+          </a:ln>
+        </p:spPr>
+        <p:style>
+          <a:lnRef idx="2">
+            <a:schemeClr val="accent1"/>
+          </a:lnRef>
+          <a:fillRef idx="0">
+            <a:schemeClr val="accent1"/>
+          </a:fillRef>
+          <a:effectRef idx="1">
+            <a:schemeClr val="accent1"/>
+          </a:effectRef>
+          <a:fontRef idx="minor">
+            <a:schemeClr val="tx1"/>
+          </a:fontRef>
+        </p:style>
+      </p:cxnSp>
+      <p:cxnSp>
+        <p:nvCxnSpPr>
+          <p:cNvPr id="9" name="Straight Connector 8">
+            <a:extLst>
+              <a:ext uri="{FF2B5EF4-FFF2-40B4-BE49-F238E27FC236}">
+                <a16:creationId xmlns:a16="http://schemas.microsoft.com/office/drawing/2014/main" id="{E9161FAD-7B98-8C35-B0B5-81FD7A9F96DD}"/>
+              </a:ext>
+            </a:extLst>
+          </p:cNvPr>
+          <p:cNvCxnSpPr/>
+          <p:nvPr/>
+        </p:nvCxnSpPr>
+        <p:spPr>
+          <a:xfrm>
+            <a:off x="518160" y="3461290"/>
+            <a:ext cx="1409700" cy="0"/>
+          </a:xfrm>
+          <a:prstGeom prst="line">
+            <a:avLst/>
+          </a:prstGeom>
+          <a:ln>
+            <a:solidFill>
+              <a:schemeClr val="bg1"/>
+            </a:solidFill>
+          </a:ln>
+        </p:spPr>
+        <p:style>
+          <a:lnRef idx="2">
+            <a:schemeClr val="accent1"/>
+          </a:lnRef>
+          <a:fillRef idx="0">
+            <a:schemeClr val="accent1"/>
+          </a:fillRef>
+          <a:effectRef idx="1">
+            <a:schemeClr val="accent1"/>
+          </a:effectRef>
+          <a:fontRef idx="minor">
+            <a:schemeClr val="tx1"/>
+          </a:fontRef>
+        </p:style>
+      </p:cxnSp>
+      <p:cxnSp>
+        <p:nvCxnSpPr>
+          <p:cNvPr id="3" name="Straight Connector 2">
+            <a:extLst>
+              <a:ext uri="{FF2B5EF4-FFF2-40B4-BE49-F238E27FC236}">
+                <a16:creationId xmlns:a16="http://schemas.microsoft.com/office/drawing/2014/main" id="{0A3065B4-A0D2-9183-3E12-13C933A44C59}"/>
+              </a:ext>
+            </a:extLst>
+          </p:cNvPr>
+          <p:cNvCxnSpPr>
+            <a:cxnSpLocks/>
+          </p:cNvCxnSpPr>
+          <p:nvPr/>
+        </p:nvCxnSpPr>
+        <p:spPr>
+          <a:xfrm>
+            <a:off x="6605752" y="3461290"/>
+            <a:ext cx="577733" cy="0"/>
+          </a:xfrm>
+          <a:prstGeom prst="line">
+            <a:avLst/>
+          </a:prstGeom>
+          <a:ln>
+            <a:solidFill>
+              <a:schemeClr val="bg1"/>
+            </a:solidFill>
+          </a:ln>
+        </p:spPr>
+        <p:style>
+          <a:lnRef idx="2">
+            <a:schemeClr val="accent1"/>
+          </a:lnRef>
+          <a:fillRef idx="0">
+            <a:schemeClr val="accent1"/>
+          </a:fillRef>
+          <a:effectRef idx="1">
+            <a:schemeClr val="accent1"/>
+          </a:effectRef>
+          <a:fontRef idx="minor">
+            <a:schemeClr val="tx1"/>
+          </a:fontRef>
+        </p:style>
+      </p:cxnSp>
+      <p:cxnSp>
+        <p:nvCxnSpPr>
+          <p:cNvPr id="10" name="Straight Connector 9">
+            <a:extLst>
+              <a:ext uri="{FF2B5EF4-FFF2-40B4-BE49-F238E27FC236}">
+                <a16:creationId xmlns:a16="http://schemas.microsoft.com/office/drawing/2014/main" id="{43383736-1FAE-45EB-B9F6-84A8F3C48CD3}"/>
+              </a:ext>
+            </a:extLst>
+          </p:cNvPr>
+          <p:cNvCxnSpPr>
+            <a:cxnSpLocks/>
+          </p:cNvCxnSpPr>
+          <p:nvPr/>
+        </p:nvCxnSpPr>
+        <p:spPr>
+          <a:xfrm>
+            <a:off x="5020491" y="3461290"/>
+            <a:ext cx="680257" cy="0"/>
+          </a:xfrm>
+          <a:prstGeom prst="line">
+            <a:avLst/>
+          </a:prstGeom>
+          <a:ln>
+            <a:solidFill>
+              <a:schemeClr val="bg1"/>
+            </a:solidFill>
+          </a:ln>
+        </p:spPr>
+        <p:style>
+          <a:lnRef idx="2">
+            <a:schemeClr val="accent1"/>
+          </a:lnRef>
+          <a:fillRef idx="0">
+            <a:schemeClr val="accent1"/>
+          </a:fillRef>
+          <a:effectRef idx="1">
+            <a:schemeClr val="accent1"/>
+          </a:effectRef>
+          <a:fontRef idx="minor">
+            <a:schemeClr val="tx1"/>
+          </a:fontRef>
+        </p:style>
+      </p:cxnSp>
     </p:spTree>
     <p:extLst>
       <p:ext uri="{BB962C8B-B14F-4D97-AF65-F5344CB8AC3E}">

</xml_diff>